<commit_message>
udpated pca with custom legend for context
</commit_message>
<xml_diff>
--- a/Figures/PCA/formatting PCA fig.pptx
+++ b/Figures/PCA/formatting PCA fig.pptx
@@ -104,6 +104,11 @@
       </a:defRPr>
     </a:lvl9pPr>
   </p:defaultTextStyle>
+  <p:extLst>
+    <p:ext uri="{EFAFB233-063F-42B5-8137-9DF3F51BA10A}">
+      <p15:sldGuideLst xmlns:p15="http://schemas.microsoft.com/office/powerpoint/2012/main"/>
+    </p:ext>
+  </p:extLst>
 </p:presentation>
 </file>
 
@@ -254,7 +259,7 @@
           <a:p>
             <a:fld id="{AEA101FA-E483-4258-8B1C-E97BC5D37C4B}" type="datetimeFigureOut">
               <a:rPr lang="en-US" smtClean="0"/>
-              <a:t>7/25/2024</a:t>
+              <a:t>8/1/2024</a:t>
             </a:fld>
             <a:endParaRPr lang="en-US"/>
           </a:p>
@@ -452,7 +457,7 @@
           <a:p>
             <a:fld id="{AEA101FA-E483-4258-8B1C-E97BC5D37C4B}" type="datetimeFigureOut">
               <a:rPr lang="en-US" smtClean="0"/>
-              <a:t>7/25/2024</a:t>
+              <a:t>8/1/2024</a:t>
             </a:fld>
             <a:endParaRPr lang="en-US"/>
           </a:p>
@@ -660,7 +665,7 @@
           <a:p>
             <a:fld id="{AEA101FA-E483-4258-8B1C-E97BC5D37C4B}" type="datetimeFigureOut">
               <a:rPr lang="en-US" smtClean="0"/>
-              <a:t>7/25/2024</a:t>
+              <a:t>8/1/2024</a:t>
             </a:fld>
             <a:endParaRPr lang="en-US"/>
           </a:p>
@@ -858,7 +863,7 @@
           <a:p>
             <a:fld id="{AEA101FA-E483-4258-8B1C-E97BC5D37C4B}" type="datetimeFigureOut">
               <a:rPr lang="en-US" smtClean="0"/>
-              <a:t>7/25/2024</a:t>
+              <a:t>8/1/2024</a:t>
             </a:fld>
             <a:endParaRPr lang="en-US"/>
           </a:p>
@@ -1133,7 +1138,7 @@
           <a:p>
             <a:fld id="{AEA101FA-E483-4258-8B1C-E97BC5D37C4B}" type="datetimeFigureOut">
               <a:rPr lang="en-US" smtClean="0"/>
-              <a:t>7/25/2024</a:t>
+              <a:t>8/1/2024</a:t>
             </a:fld>
             <a:endParaRPr lang="en-US"/>
           </a:p>
@@ -1398,7 +1403,7 @@
           <a:p>
             <a:fld id="{AEA101FA-E483-4258-8B1C-E97BC5D37C4B}" type="datetimeFigureOut">
               <a:rPr lang="en-US" smtClean="0"/>
-              <a:t>7/25/2024</a:t>
+              <a:t>8/1/2024</a:t>
             </a:fld>
             <a:endParaRPr lang="en-US"/>
           </a:p>
@@ -1810,7 +1815,7 @@
           <a:p>
             <a:fld id="{AEA101FA-E483-4258-8B1C-E97BC5D37C4B}" type="datetimeFigureOut">
               <a:rPr lang="en-US" smtClean="0"/>
-              <a:t>7/25/2024</a:t>
+              <a:t>8/1/2024</a:t>
             </a:fld>
             <a:endParaRPr lang="en-US"/>
           </a:p>
@@ -1951,7 +1956,7 @@
           <a:p>
             <a:fld id="{AEA101FA-E483-4258-8B1C-E97BC5D37C4B}" type="datetimeFigureOut">
               <a:rPr lang="en-US" smtClean="0"/>
-              <a:t>7/25/2024</a:t>
+              <a:t>8/1/2024</a:t>
             </a:fld>
             <a:endParaRPr lang="en-US"/>
           </a:p>
@@ -2064,7 +2069,7 @@
           <a:p>
             <a:fld id="{AEA101FA-E483-4258-8B1C-E97BC5D37C4B}" type="datetimeFigureOut">
               <a:rPr lang="en-US" smtClean="0"/>
-              <a:t>7/25/2024</a:t>
+              <a:t>8/1/2024</a:t>
             </a:fld>
             <a:endParaRPr lang="en-US"/>
           </a:p>
@@ -2375,7 +2380,7 @@
           <a:p>
             <a:fld id="{AEA101FA-E483-4258-8B1C-E97BC5D37C4B}" type="datetimeFigureOut">
               <a:rPr lang="en-US" smtClean="0"/>
-              <a:t>7/25/2024</a:t>
+              <a:t>8/1/2024</a:t>
             </a:fld>
             <a:endParaRPr lang="en-US"/>
           </a:p>
@@ -2663,7 +2668,7 @@
           <a:p>
             <a:fld id="{AEA101FA-E483-4258-8B1C-E97BC5D37C4B}" type="datetimeFigureOut">
               <a:rPr lang="en-US" smtClean="0"/>
-              <a:t>7/25/2024</a:t>
+              <a:t>8/1/2024</a:t>
             </a:fld>
             <a:endParaRPr lang="en-US"/>
           </a:p>
@@ -2904,7 +2909,7 @@
           <a:p>
             <a:fld id="{AEA101FA-E483-4258-8B1C-E97BC5D37C4B}" type="datetimeFigureOut">
               <a:rPr lang="en-US" smtClean="0"/>
-              <a:t>7/25/2024</a:t>
+              <a:t>8/1/2024</a:t>
             </a:fld>
             <a:endParaRPr lang="en-US"/>
           </a:p>
@@ -3323,10 +3328,10 @@
       </p:grpSpPr>
       <p:grpSp>
         <p:nvGrpSpPr>
-          <p:cNvPr id="21" name="Group 20">
-            <a:extLst>
-              <a:ext uri="{FF2B5EF4-FFF2-40B4-BE49-F238E27FC236}">
-                <a16:creationId xmlns:a16="http://schemas.microsoft.com/office/drawing/2014/main" id="{EBB253D1-C3B3-D1C4-36A4-ACCC9901084A}"/>
+          <p:cNvPr id="4" name="Group 3">
+            <a:extLst>
+              <a:ext uri="{FF2B5EF4-FFF2-40B4-BE49-F238E27FC236}">
+                <a16:creationId xmlns:a16="http://schemas.microsoft.com/office/drawing/2014/main" id="{1506361A-AABD-812B-71EA-01131C62D59D}"/>
               </a:ext>
             </a:extLst>
           </p:cNvPr>
@@ -3336,9 +3341,9 @@
         <p:grpSpPr>
           <a:xfrm>
             <a:off x="1670609" y="130148"/>
-            <a:ext cx="8343830" cy="6597703"/>
+            <a:ext cx="7868085" cy="6597703"/>
             <a:chOff x="1670609" y="130148"/>
-            <a:chExt cx="8343830" cy="6597703"/>
+            <a:chExt cx="7868085" cy="6597703"/>
           </a:xfrm>
         </p:grpSpPr>
         <p:grpSp>
@@ -3356,9 +3361,9 @@
           <p:grpSpPr>
             <a:xfrm>
               <a:off x="1670609" y="130148"/>
-              <a:ext cx="8343830" cy="6597703"/>
+              <a:ext cx="5748287" cy="6597703"/>
               <a:chOff x="1265957" y="0"/>
-              <a:chExt cx="7653625" cy="5969969"/>
+              <a:chExt cx="5272786" cy="5969969"/>
             </a:xfrm>
           </p:grpSpPr>
           <p:pic>
@@ -3375,7 +3380,7 @@
               </p:cNvPicPr>
               <p:nvPr/>
             </p:nvPicPr>
-            <p:blipFill>
+            <p:blipFill rotWithShape="1">
               <a:blip r:embed="rId2">
                 <a:extLst>
                   <a:ext uri="{28A0092B-C50C-407E-A947-70E740481C1C}">
@@ -3383,13 +3388,13 @@
                   </a:ext>
                 </a:extLst>
               </a:blip>
-              <a:srcRect/>
+              <a:srcRect r="33820"/>
               <a:stretch/>
             </p:blipFill>
             <p:spPr>
               <a:xfrm>
                 <a:off x="1879854" y="0"/>
-                <a:ext cx="7039728" cy="4873658"/>
+                <a:ext cx="4658889" cy="4873658"/>
               </a:xfrm>
               <a:prstGeom prst="rect">
                 <a:avLst/>
@@ -3904,72 +3909,42 @@
             </p:sp>
           </p:grpSp>
         </p:grpSp>
-        <p:sp>
-          <p:nvSpPr>
-            <p:cNvPr id="20" name="TextBox 19">
+        <p:pic>
+          <p:nvPicPr>
+            <p:cNvPr id="3" name="Picture 2" descr="A map of a state with different colored spots&#10;&#10;Description automatically generated">
               <a:extLst>
                 <a:ext uri="{FF2B5EF4-FFF2-40B4-BE49-F238E27FC236}">
-                  <a16:creationId xmlns:a16="http://schemas.microsoft.com/office/drawing/2014/main" id="{8DC52762-B94A-BF98-9D66-546983805259}"/>
+                  <a16:creationId xmlns:a16="http://schemas.microsoft.com/office/drawing/2014/main" id="{1867AF1E-2B46-B1CB-9F5E-FD2E4C716950}"/>
                 </a:ext>
               </a:extLst>
             </p:cNvPr>
-            <p:cNvSpPr txBox="1"/>
+            <p:cNvPicPr>
+              <a:picLocks noChangeAspect="1"/>
+            </p:cNvPicPr>
             <p:nvPr/>
-          </p:nvSpPr>
+          </p:nvPicPr>
+          <p:blipFill>
+            <a:blip r:embed="rId3">
+              <a:extLst>
+                <a:ext uri="{28A0092B-C50C-407E-A947-70E740481C1C}">
+                  <a14:useLocalDpi xmlns:a14="http://schemas.microsoft.com/office/drawing/2010/main" val="0"/>
+                </a:ext>
+              </a:extLst>
+            </a:blip>
+            <a:stretch>
+              <a:fillRect/>
+            </a:stretch>
+          </p:blipFill>
           <p:spPr>
             <a:xfrm>
-              <a:off x="6998900" y="292427"/>
-              <a:ext cx="2635932" cy="692497"/>
+              <a:off x="7147080" y="237905"/>
+              <a:ext cx="2391614" cy="5170602"/>
             </a:xfrm>
             <a:prstGeom prst="rect">
               <a:avLst/>
             </a:prstGeom>
-            <a:noFill/>
           </p:spPr>
-          <p:txBody>
-            <a:bodyPr wrap="square" rtlCol="0">
-              <a:spAutoFit/>
-            </a:bodyPr>
-            <a:lstStyle/>
-            <a:p>
-              <a:pPr algn="ctr"/>
-              <a:r>
-                <a:rPr lang="en-US" sz="1300" dirty="0" err="1">
-                  <a:latin typeface="Arial" panose="020B0604020202020204" pitchFamily="34" charset="0"/>
-                  <a:cs typeface="Arial" panose="020B0604020202020204" pitchFamily="34" charset="0"/>
-                </a:rPr>
-                <a:t>lm</a:t>
-              </a:r>
-              <a:r>
-                <a:rPr lang="en-US" sz="1300" dirty="0">
-                  <a:latin typeface="Arial" panose="020B0604020202020204" pitchFamily="34" charset="0"/>
-                  <a:cs typeface="Arial" panose="020B0604020202020204" pitchFamily="34" charset="0"/>
-                </a:rPr>
-                <a:t>(site location ~ PC1 + PC3)</a:t>
-              </a:r>
-            </a:p>
-            <a:p>
-              <a:pPr algn="ctr"/>
-              <a:r>
-                <a:rPr lang="en-US" sz="1300" dirty="0">
-                  <a:latin typeface="Arial" panose="020B0604020202020204" pitchFamily="34" charset="0"/>
-                  <a:cs typeface="Arial" panose="020B0604020202020204" pitchFamily="34" charset="0"/>
-                </a:rPr>
-                <a:t>R2 = 0.52</a:t>
-              </a:r>
-            </a:p>
-            <a:p>
-              <a:pPr algn="ctr"/>
-              <a:r>
-                <a:rPr lang="en-US" sz="1300" dirty="0">
-                  <a:latin typeface="Arial" panose="020B0604020202020204" pitchFamily="34" charset="0"/>
-                  <a:cs typeface="Arial" panose="020B0604020202020204" pitchFamily="34" charset="0"/>
-                </a:rPr>
-                <a:t>p &lt; 0.0001</a:t>
-              </a:r>
-            </a:p>
-          </p:txBody>
-        </p:sp>
+        </p:pic>
       </p:grpSp>
     </p:spTree>
     <p:extLst>

</xml_diff>